<commit_message>
Updated the NLLS lab for the new URL
</commit_message>
<xml_diff>
--- a/lectures/Lect08b_Kernel.pptx
+++ b/lectures/Lect08b_Kernel.pptx
@@ -5,7 +5,7 @@
     <p:sldMasterId id="2147483648" r:id="rId1"/>
   </p:sldMasterIdLst>
   <p:notesMasterIdLst>
-    <p:notesMasterId r:id="rId49"/>
+    <p:notesMasterId r:id="rId50"/>
   </p:notesMasterIdLst>
   <p:sldIdLst>
     <p:sldId id="258" r:id="rId2"/>
@@ -40,21 +40,22 @@
     <p:sldId id="377" r:id="rId31"/>
     <p:sldId id="379" r:id="rId32"/>
     <p:sldId id="380" r:id="rId33"/>
-    <p:sldId id="404" r:id="rId34"/>
-    <p:sldId id="405" r:id="rId35"/>
-    <p:sldId id="407" r:id="rId36"/>
-    <p:sldId id="408" r:id="rId37"/>
-    <p:sldId id="406" r:id="rId38"/>
-    <p:sldId id="410" r:id="rId39"/>
-    <p:sldId id="411" r:id="rId40"/>
-    <p:sldId id="412" r:id="rId41"/>
-    <p:sldId id="413" r:id="rId42"/>
-    <p:sldId id="414" r:id="rId43"/>
-    <p:sldId id="415" r:id="rId44"/>
-    <p:sldId id="417" r:id="rId45"/>
-    <p:sldId id="416" r:id="rId46"/>
-    <p:sldId id="418" r:id="rId47"/>
-    <p:sldId id="419" r:id="rId48"/>
+    <p:sldId id="423" r:id="rId34"/>
+    <p:sldId id="404" r:id="rId35"/>
+    <p:sldId id="405" r:id="rId36"/>
+    <p:sldId id="407" r:id="rId37"/>
+    <p:sldId id="408" r:id="rId38"/>
+    <p:sldId id="406" r:id="rId39"/>
+    <p:sldId id="410" r:id="rId40"/>
+    <p:sldId id="411" r:id="rId41"/>
+    <p:sldId id="412" r:id="rId42"/>
+    <p:sldId id="413" r:id="rId43"/>
+    <p:sldId id="414" r:id="rId44"/>
+    <p:sldId id="415" r:id="rId45"/>
+    <p:sldId id="417" r:id="rId46"/>
+    <p:sldId id="416" r:id="rId47"/>
+    <p:sldId id="418" r:id="rId48"/>
+    <p:sldId id="419" r:id="rId49"/>
   </p:sldIdLst>
   <p:sldSz cx="12192000" cy="6858000"/>
   <p:notesSz cx="7315200" cy="9601200"/>
@@ -254,7 +255,7 @@
           <a:p>
             <a:fld id="{B7D6DDD3-D7E9-488B-B626-1E8285E424D8}" type="datetimeFigureOut">
               <a:rPr lang="en-US" smtClean="0"/>
-              <a:t>10/6/2025</a:t>
+              <a:t>10/7/2025</a:t>
             </a:fld>
             <a:endParaRPr lang="en-US"/>
           </a:p>
@@ -4805,8 +4806,8 @@
           </a:p>
         </p:txBody>
       </p:sp>
-      <mc:AlternateContent xmlns:mc="http://schemas.openxmlformats.org/markup-compatibility/2006">
-        <mc:Choice xmlns:a14="http://schemas.microsoft.com/office/drawing/2010/main" Requires="a14">
+      <mc:AlternateContent xmlns:mc="http://schemas.openxmlformats.org/markup-compatibility/2006" xmlns:a14="http://schemas.microsoft.com/office/drawing/2010/main">
+        <mc:Choice Requires="a14">
           <p:sp>
             <p:nvSpPr>
               <p:cNvPr id="3" name="Content Placeholder 2">
@@ -5514,7 +5515,7 @@
             </p:txBody>
           </p:sp>
         </mc:Choice>
-        <mc:Fallback>
+        <mc:Fallback xmlns="">
           <p:sp>
             <p:nvSpPr>
               <p:cNvPr id="3" name="Content Placeholder 2">
@@ -5664,8 +5665,8 @@
           </a:p>
         </p:txBody>
       </p:sp>
-      <mc:AlternateContent xmlns:mc="http://schemas.openxmlformats.org/markup-compatibility/2006">
-        <mc:Choice xmlns:a14="http://schemas.microsoft.com/office/drawing/2010/main" Requires="a14">
+      <mc:AlternateContent xmlns:mc="http://schemas.openxmlformats.org/markup-compatibility/2006" xmlns:a14="http://schemas.microsoft.com/office/drawing/2010/main">
+        <mc:Choice Requires="a14">
           <p:sp>
             <p:nvSpPr>
               <p:cNvPr id="8" name="TextBox 7">
@@ -5790,7 +5791,7 @@
             </p:txBody>
           </p:sp>
         </mc:Choice>
-        <mc:Fallback>
+        <mc:Fallback xmlns="">
           <p:sp>
             <p:nvSpPr>
               <p:cNvPr id="8" name="TextBox 7">
@@ -5835,8 +5836,8 @@
           </p:sp>
         </mc:Fallback>
       </mc:AlternateContent>
-      <mc:AlternateContent xmlns:mc="http://schemas.openxmlformats.org/markup-compatibility/2006">
-        <mc:Choice xmlns:a14="http://schemas.microsoft.com/office/drawing/2010/main" Requires="a14">
+      <mc:AlternateContent xmlns:mc="http://schemas.openxmlformats.org/markup-compatibility/2006" xmlns:a14="http://schemas.microsoft.com/office/drawing/2010/main">
+        <mc:Choice Requires="a14">
           <p:sp>
             <p:nvSpPr>
               <p:cNvPr id="9" name="TextBox 8">
@@ -5865,6 +5866,7 @@
               </a:bodyPr>
               <a:lstStyle/>
               <a:p>
+                <a:pPr/>
                 <a14:m>
                   <m:oMathPara xmlns:m="http://schemas.openxmlformats.org/officeDocument/2006/math">
                     <m:oMathParaPr>
@@ -5910,7 +5912,7 @@
             </p:txBody>
           </p:sp>
         </mc:Choice>
-        <mc:Fallback>
+        <mc:Fallback xmlns="">
           <p:sp>
             <p:nvSpPr>
               <p:cNvPr id="9" name="TextBox 8">
@@ -6054,8 +6056,8 @@
           </a:p>
         </p:txBody>
       </p:sp>
-      <mc:AlternateContent xmlns:mc="http://schemas.openxmlformats.org/markup-compatibility/2006">
-        <mc:Choice xmlns:a14="http://schemas.microsoft.com/office/drawing/2010/main" Requires="a14">
+      <mc:AlternateContent xmlns:mc="http://schemas.openxmlformats.org/markup-compatibility/2006" xmlns:a14="http://schemas.microsoft.com/office/drawing/2010/main">
+        <mc:Choice Requires="a14">
           <p:sp>
             <p:nvSpPr>
               <p:cNvPr id="3" name="Content Placeholder 2">
@@ -7406,7 +7408,7 @@
             </p:txBody>
           </p:sp>
         </mc:Choice>
-        <mc:Fallback>
+        <mc:Fallback xmlns="">
           <p:sp>
             <p:nvSpPr>
               <p:cNvPr id="3" name="Content Placeholder 2">
@@ -7533,8 +7535,8 @@
           </a:p>
         </p:txBody>
       </p:sp>
-      <mc:AlternateContent xmlns:mc="http://schemas.openxmlformats.org/markup-compatibility/2006">
-        <mc:Choice xmlns:a14="http://schemas.microsoft.com/office/drawing/2010/main" Requires="a14">
+      <mc:AlternateContent xmlns:mc="http://schemas.openxmlformats.org/markup-compatibility/2006" xmlns:a14="http://schemas.microsoft.com/office/drawing/2010/main">
+        <mc:Choice Requires="a14">
           <p:sp>
             <p:nvSpPr>
               <p:cNvPr id="3" name="Content Placeholder 2">
@@ -7584,7 +7586,7 @@
             </p:txBody>
           </p:sp>
         </mc:Choice>
-        <mc:Fallback>
+        <mc:Fallback xmlns="">
           <p:sp>
             <p:nvSpPr>
               <p:cNvPr id="3" name="Content Placeholder 2">
@@ -8598,8 +8600,8 @@
           </a:p>
         </p:txBody>
       </p:sp>
-      <mc:AlternateContent xmlns:mc="http://schemas.openxmlformats.org/markup-compatibility/2006">
-        <mc:Choice xmlns:a14="http://schemas.microsoft.com/office/drawing/2010/main" Requires="a14">
+      <mc:AlternateContent xmlns:mc="http://schemas.openxmlformats.org/markup-compatibility/2006" xmlns:a14="http://schemas.microsoft.com/office/drawing/2010/main">
+        <mc:Choice Requires="a14">
           <p:sp>
             <p:nvSpPr>
               <p:cNvPr id="3" name="Content Placeholder 2">
@@ -9356,7 +9358,7 @@
             </p:txBody>
           </p:sp>
         </mc:Choice>
-        <mc:Fallback>
+        <mc:Fallback xmlns="">
           <p:sp>
             <p:nvSpPr>
               <p:cNvPr id="3" name="Content Placeholder 2">
@@ -9530,8 +9532,8 @@
           </a:p>
         </p:txBody>
       </p:sp>
-      <mc:AlternateContent xmlns:mc="http://schemas.openxmlformats.org/markup-compatibility/2006">
-        <mc:Choice xmlns:a14="http://schemas.microsoft.com/office/drawing/2010/main" Requires="a14">
+      <mc:AlternateContent xmlns:mc="http://schemas.openxmlformats.org/markup-compatibility/2006" xmlns:a14="http://schemas.microsoft.com/office/drawing/2010/main">
+        <mc:Choice Requires="a14">
           <p:sp>
             <p:nvSpPr>
               <p:cNvPr id="3" name="Content Placeholder 2">
@@ -9588,7 +9590,7 @@
             </p:txBody>
           </p:sp>
         </mc:Choice>
-        <mc:Fallback>
+        <mc:Fallback xmlns="">
           <p:sp>
             <p:nvSpPr>
               <p:cNvPr id="3" name="Content Placeholder 2">
@@ -9751,8 +9753,8 @@
           </a:p>
         </p:txBody>
       </p:sp>
-      <mc:AlternateContent xmlns:mc="http://schemas.openxmlformats.org/markup-compatibility/2006">
-        <mc:Choice xmlns:a14="http://schemas.microsoft.com/office/drawing/2010/main" Requires="a14">
+      <mc:AlternateContent xmlns:mc="http://schemas.openxmlformats.org/markup-compatibility/2006" xmlns:a14="http://schemas.microsoft.com/office/drawing/2010/main">
+        <mc:Choice Requires="a14">
           <p:sp>
             <p:nvSpPr>
               <p:cNvPr id="3" name="Content Placeholder 2">
@@ -9812,7 +9814,7 @@
             </p:txBody>
           </p:sp>
         </mc:Choice>
-        <mc:Fallback>
+        <mc:Fallback xmlns="">
           <p:sp>
             <p:nvSpPr>
               <p:cNvPr id="3" name="Content Placeholder 2">
@@ -9985,8 +9987,8 @@
           </a:p>
         </p:txBody>
       </p:sp>
-      <mc:AlternateContent xmlns:mc="http://schemas.openxmlformats.org/markup-compatibility/2006">
-        <mc:Choice xmlns:a14="http://schemas.microsoft.com/office/drawing/2010/main" Requires="a14">
+      <mc:AlternateContent xmlns:mc="http://schemas.openxmlformats.org/markup-compatibility/2006" xmlns:a14="http://schemas.microsoft.com/office/drawing/2010/main">
+        <mc:Choice Requires="a14">
           <p:sp>
             <p:nvSpPr>
               <p:cNvPr id="3" name="Content Placeholder 2"/>
@@ -10480,7 +10482,7 @@
             </p:txBody>
           </p:sp>
         </mc:Choice>
-        <mc:Fallback>
+        <mc:Fallback xmlns="">
           <p:sp>
             <p:nvSpPr>
               <p:cNvPr id="3" name="Content Placeholder 2"/>
@@ -11522,8 +11524,8 @@
           </a:p>
         </p:txBody>
       </p:sp>
-      <mc:AlternateContent xmlns:mc="http://schemas.openxmlformats.org/markup-compatibility/2006">
-        <mc:Choice xmlns:a14="http://schemas.microsoft.com/office/drawing/2010/main" Requires="a14">
+      <mc:AlternateContent xmlns:mc="http://schemas.openxmlformats.org/markup-compatibility/2006" xmlns:a14="http://schemas.microsoft.com/office/drawing/2010/main">
+        <mc:Choice Requires="a14">
           <p:sp>
             <p:nvSpPr>
               <p:cNvPr id="3" name="Content Placeholder 2"/>
@@ -12223,7 +12225,7 @@
             </p:txBody>
           </p:sp>
         </mc:Choice>
-        <mc:Fallback>
+        <mc:Fallback xmlns="">
           <p:sp>
             <p:nvSpPr>
               <p:cNvPr id="3" name="Content Placeholder 2"/>
@@ -14041,8 +14043,8 @@
           </a:p>
         </p:txBody>
       </p:sp>
-      <mc:AlternateContent xmlns:mc="http://schemas.openxmlformats.org/markup-compatibility/2006">
-        <mc:Choice xmlns:a14="http://schemas.microsoft.com/office/drawing/2010/main" Requires="a14">
+      <mc:AlternateContent xmlns:mc="http://schemas.openxmlformats.org/markup-compatibility/2006" xmlns:a14="http://schemas.microsoft.com/office/drawing/2010/main">
+        <mc:Choice Requires="a14">
           <p:sp>
             <p:nvSpPr>
               <p:cNvPr id="3" name="Content Placeholder 2">
@@ -14731,7 +14733,7 @@
             </p:txBody>
           </p:sp>
         </mc:Choice>
-        <mc:Fallback>
+        <mc:Fallback xmlns="">
           <p:sp>
             <p:nvSpPr>
               <p:cNvPr id="3" name="Content Placeholder 2">
@@ -14898,8 +14900,8 @@
           </a:p>
         </p:txBody>
       </p:sp>
-      <mc:AlternateContent xmlns:mc="http://schemas.openxmlformats.org/markup-compatibility/2006">
-        <mc:Choice xmlns:a14="http://schemas.microsoft.com/office/drawing/2010/main" Requires="a14">
+      <mc:AlternateContent xmlns:mc="http://schemas.openxmlformats.org/markup-compatibility/2006" xmlns:a14="http://schemas.microsoft.com/office/drawing/2010/main">
+        <mc:Choice Requires="a14">
           <p:sp>
             <p:nvSpPr>
               <p:cNvPr id="3" name="Content Placeholder 2">
@@ -15800,7 +15802,7 @@
             </p:txBody>
           </p:sp>
         </mc:Choice>
-        <mc:Fallback>
+        <mc:Fallback xmlns="">
           <p:sp>
             <p:nvSpPr>
               <p:cNvPr id="3" name="Content Placeholder 2">
@@ -15996,8 +15998,8 @@
           </a:p>
         </p:txBody>
       </p:sp>
-      <mc:AlternateContent xmlns:mc="http://schemas.openxmlformats.org/markup-compatibility/2006">
-        <mc:Choice xmlns:a14="http://schemas.microsoft.com/office/drawing/2010/main" Requires="a14">
+      <mc:AlternateContent xmlns:mc="http://schemas.openxmlformats.org/markup-compatibility/2006" xmlns:a14="http://schemas.microsoft.com/office/drawing/2010/main">
+        <mc:Choice Requires="a14">
           <p:graphicFrame>
             <p:nvGraphicFramePr>
               <p:cNvPr id="5" name="Table 4">
@@ -16071,6 +16073,7 @@
                         <a:bodyPr/>
                         <a:lstStyle/>
                         <a:p>
+                          <a:pPr/>
                           <a14:m>
                             <m:oMathPara xmlns:m="http://schemas.openxmlformats.org/officeDocument/2006/math">
                               <m:oMathParaPr>
@@ -16096,6 +16099,7 @@
                         <a:bodyPr/>
                         <a:lstStyle/>
                         <a:p>
+                          <a:pPr/>
                           <a14:m>
                             <m:oMathPara xmlns:m="http://schemas.openxmlformats.org/officeDocument/2006/math">
                               <m:oMathParaPr>
@@ -16140,6 +16144,7 @@
                         <a:bodyPr/>
                         <a:lstStyle/>
                         <a:p>
+                          <a:pPr/>
                           <a14:m>
                             <m:oMathPara xmlns:m="http://schemas.openxmlformats.org/officeDocument/2006/math">
                               <m:oMathParaPr>
@@ -16184,6 +16189,7 @@
                         <a:bodyPr/>
                         <a:lstStyle/>
                         <a:p>
+                          <a:pPr/>
                           <a14:m>
                             <m:oMathPara xmlns:m="http://schemas.openxmlformats.org/officeDocument/2006/math">
                               <m:oMathParaPr>
@@ -16277,6 +16283,7 @@
                         <a:bodyPr/>
                         <a:lstStyle/>
                         <a:p>
+                          <a:pPr/>
                           <a14:m>
                             <m:oMathPara xmlns:m="http://schemas.openxmlformats.org/officeDocument/2006/math">
                               <m:oMathParaPr>
@@ -16742,6 +16749,7 @@
                         <a:bodyPr/>
                         <a:lstStyle/>
                         <a:p>
+                          <a:pPr/>
                           <a14:m>
                             <m:oMathPara xmlns:m="http://schemas.openxmlformats.org/officeDocument/2006/math">
                               <m:oMathParaPr>
@@ -16868,7 +16876,7 @@
             </a:graphic>
           </p:graphicFrame>
         </mc:Choice>
-        <mc:Fallback>
+        <mc:Fallback xmlns="">
           <p:graphicFrame>
             <p:nvGraphicFramePr>
               <p:cNvPr id="5" name="Table 4">
@@ -17410,8 +17418,8 @@
           </p:graphicFrame>
         </mc:Fallback>
       </mc:AlternateContent>
-      <mc:AlternateContent xmlns:mc="http://schemas.openxmlformats.org/markup-compatibility/2006">
-        <mc:Choice xmlns:a14="http://schemas.microsoft.com/office/drawing/2010/main" Requires="a14">
+      <mc:AlternateContent xmlns:mc="http://schemas.openxmlformats.org/markup-compatibility/2006" xmlns:a14="http://schemas.microsoft.com/office/drawing/2010/main">
+        <mc:Choice Requires="a14">
           <p:sp>
             <p:nvSpPr>
               <p:cNvPr id="13" name="TextBox 12">
@@ -17572,7 +17580,7 @@
             </p:txBody>
           </p:sp>
         </mc:Choice>
-        <mc:Fallback>
+        <mc:Fallback xmlns="">
           <p:sp>
             <p:nvSpPr>
               <p:cNvPr id="13" name="TextBox 12">
@@ -17647,8 +17655,8 @@
           </a:prstGeom>
         </p:spPr>
       </p:pic>
-      <mc:AlternateContent xmlns:mc="http://schemas.openxmlformats.org/markup-compatibility/2006">
-        <mc:Choice xmlns:a14="http://schemas.microsoft.com/office/drawing/2010/main" Requires="a14">
+      <mc:AlternateContent xmlns:mc="http://schemas.openxmlformats.org/markup-compatibility/2006" xmlns:a14="http://schemas.microsoft.com/office/drawing/2010/main">
+        <mc:Choice Requires="a14">
           <p:sp>
             <p:nvSpPr>
               <p:cNvPr id="8" name="TextBox 7">
@@ -17832,7 +17840,7 @@
             </p:txBody>
           </p:sp>
         </mc:Choice>
-        <mc:Fallback>
+        <mc:Fallback xmlns="">
           <p:sp>
             <p:nvSpPr>
               <p:cNvPr id="8" name="TextBox 7">
@@ -17877,8 +17885,8 @@
           </p:sp>
         </mc:Fallback>
       </mc:AlternateContent>
-      <mc:AlternateContent xmlns:mc="http://schemas.openxmlformats.org/markup-compatibility/2006">
-        <mc:Choice xmlns:a14="http://schemas.microsoft.com/office/drawing/2010/main" Requires="a14">
+      <mc:AlternateContent xmlns:mc="http://schemas.openxmlformats.org/markup-compatibility/2006" xmlns:a14="http://schemas.microsoft.com/office/drawing/2010/main">
+        <mc:Choice Requires="a14">
           <p:sp>
             <p:nvSpPr>
               <p:cNvPr id="9" name="TextBox 8">
@@ -17907,6 +17915,7 @@
               </a:bodyPr>
               <a:lstStyle/>
               <a:p>
+                <a:pPr/>
                 <a14:m>
                   <m:oMathPara xmlns:m="http://schemas.openxmlformats.org/officeDocument/2006/math">
                     <m:oMathParaPr>
@@ -17958,7 +17967,7 @@
             </p:txBody>
           </p:sp>
         </mc:Choice>
-        <mc:Fallback>
+        <mc:Fallback xmlns="">
           <p:sp>
             <p:nvSpPr>
               <p:cNvPr id="9" name="TextBox 8">
@@ -18003,8 +18012,8 @@
           </p:sp>
         </mc:Fallback>
       </mc:AlternateContent>
-      <mc:AlternateContent xmlns:mc="http://schemas.openxmlformats.org/markup-compatibility/2006">
-        <mc:Choice xmlns:a14="http://schemas.microsoft.com/office/drawing/2010/main" Requires="a14">
+      <mc:AlternateContent xmlns:mc="http://schemas.openxmlformats.org/markup-compatibility/2006" xmlns:a14="http://schemas.microsoft.com/office/drawing/2010/main">
+        <mc:Choice Requires="a14">
           <p:sp>
             <p:nvSpPr>
               <p:cNvPr id="10" name="TextBox 9">
@@ -18033,6 +18042,7 @@
               </a:bodyPr>
               <a:lstStyle/>
               <a:p>
+                <a:pPr/>
                 <a14:m>
                   <m:oMathPara xmlns:m="http://schemas.openxmlformats.org/officeDocument/2006/math">
                     <m:oMathParaPr>
@@ -18072,7 +18082,7 @@
             </p:txBody>
           </p:sp>
         </mc:Choice>
-        <mc:Fallback>
+        <mc:Fallback xmlns="">
           <p:sp>
             <p:nvSpPr>
               <p:cNvPr id="10" name="TextBox 9">
@@ -18310,7 +18320,10 @@
           <a:lstStyle/>
           <a:p>
             <a:pPr algn="ctr"/>
-            <a:endParaRPr lang="en-US"/>
+            <a:r>
+              <a:rPr lang="en-US"/>
+              <a:t>s</a:t>
+            </a:r>
           </a:p>
         </p:txBody>
       </p:sp>
@@ -18674,8 +18687,8 @@
           </a:p>
         </p:txBody>
       </p:sp>
-      <mc:AlternateContent xmlns:mc="http://schemas.openxmlformats.org/markup-compatibility/2006">
-        <mc:Choice xmlns:a14="http://schemas.microsoft.com/office/drawing/2010/main" Requires="a14">
+      <mc:AlternateContent xmlns:mc="http://schemas.openxmlformats.org/markup-compatibility/2006" xmlns:a14="http://schemas.microsoft.com/office/drawing/2010/main">
+        <mc:Choice Requires="a14">
           <p:sp>
             <p:nvSpPr>
               <p:cNvPr id="3" name="Content Placeholder 2">
@@ -19187,7 +19200,7 @@
             </p:txBody>
           </p:sp>
         </mc:Choice>
-        <mc:Fallback>
+        <mc:Fallback xmlns="">
           <p:sp>
             <p:nvSpPr>
               <p:cNvPr id="3" name="Content Placeholder 2">
@@ -19286,8 +19299,8 @@
           </a:prstGeom>
         </p:spPr>
       </p:pic>
-      <mc:AlternateContent xmlns:mc="http://schemas.openxmlformats.org/markup-compatibility/2006">
-        <mc:Choice xmlns:a14="http://schemas.microsoft.com/office/drawing/2010/main" Requires="a14">
+      <mc:AlternateContent xmlns:mc="http://schemas.openxmlformats.org/markup-compatibility/2006" xmlns:a14="http://schemas.microsoft.com/office/drawing/2010/main">
+        <mc:Choice Requires="a14">
           <p:sp>
             <p:nvSpPr>
               <p:cNvPr id="9" name="TextBox 8">
@@ -19316,6 +19329,7 @@
               </a:bodyPr>
               <a:lstStyle/>
               <a:p>
+                <a:pPr/>
                 <a14:m>
                   <m:oMathPara xmlns:m="http://schemas.openxmlformats.org/officeDocument/2006/math">
                     <m:oMathParaPr>
@@ -19361,7 +19375,7 @@
             </p:txBody>
           </p:sp>
         </mc:Choice>
-        <mc:Fallback>
+        <mc:Fallback xmlns="">
           <p:sp>
             <p:nvSpPr>
               <p:cNvPr id="9" name="TextBox 8">
@@ -19513,8 +19527,8 @@
           </a:p>
         </p:txBody>
       </p:sp>
-      <mc:AlternateContent xmlns:mc="http://schemas.openxmlformats.org/markup-compatibility/2006">
-        <mc:Choice xmlns:a14="http://schemas.microsoft.com/office/drawing/2010/main" Requires="a14">
+      <mc:AlternateContent xmlns:mc="http://schemas.openxmlformats.org/markup-compatibility/2006" xmlns:a14="http://schemas.microsoft.com/office/drawing/2010/main">
+        <mc:Choice Requires="a14">
           <p:sp>
             <p:nvSpPr>
               <p:cNvPr id="3" name="Content Placeholder 2">
@@ -20681,7 +20695,7 @@
             </p:txBody>
           </p:sp>
         </mc:Choice>
-        <mc:Fallback>
+        <mc:Fallback xmlns="">
           <p:sp>
             <p:nvSpPr>
               <p:cNvPr id="3" name="Content Placeholder 2">
@@ -20808,8 +20822,8 @@
           </a:p>
         </p:txBody>
       </p:sp>
-      <mc:AlternateContent xmlns:mc="http://schemas.openxmlformats.org/markup-compatibility/2006">
-        <mc:Choice xmlns:a14="http://schemas.microsoft.com/office/drawing/2010/main" Requires="a14">
+      <mc:AlternateContent xmlns:mc="http://schemas.openxmlformats.org/markup-compatibility/2006" xmlns:a14="http://schemas.microsoft.com/office/drawing/2010/main">
+        <mc:Choice Requires="a14">
           <p:sp>
             <p:nvSpPr>
               <p:cNvPr id="3" name="Content Placeholder 2">
@@ -20900,13 +20914,7 @@
                       <a:rPr lang="en-US" b="0" i="1" smtClean="0">
                         <a:latin typeface="Cambria Math" panose="02040503050406030204" pitchFamily="18" charset="0"/>
                       </a:rPr>
-                      <m:t>)</m:t>
-                    </m:r>
-                    <m:r>
-                      <a:rPr lang="en-US" b="0" i="1" smtClean="0">
-                        <a:latin typeface="Cambria Math" panose="02040503050406030204" pitchFamily="18" charset="0"/>
-                      </a:rPr>
-                      <m:t>=</m:t>
+                      <m:t>)=</m:t>
                     </m:r>
                     <m:d>
                       <m:dPr>
@@ -21823,7 +21831,7 @@
             </p:txBody>
           </p:sp>
         </mc:Choice>
-        <mc:Fallback>
+        <mc:Fallback xmlns="">
           <p:sp>
             <p:nvSpPr>
               <p:cNvPr id="3" name="Content Placeholder 2">
@@ -22273,8 +22281,8 @@
           </a:fontRef>
         </p:style>
       </p:cxnSp>
-      <mc:AlternateContent xmlns:mc="http://schemas.openxmlformats.org/markup-compatibility/2006">
-        <mc:Choice xmlns:a14="http://schemas.microsoft.com/office/drawing/2010/main" Requires="a14">
+      <mc:AlternateContent xmlns:mc="http://schemas.openxmlformats.org/markup-compatibility/2006" xmlns:a14="http://schemas.microsoft.com/office/drawing/2010/main">
+        <mc:Choice Requires="a14">
           <p:sp>
             <p:nvSpPr>
               <p:cNvPr id="30" name="TextBox 29">
@@ -22343,7 +22351,7 @@
             </p:txBody>
           </p:sp>
         </mc:Choice>
-        <mc:Fallback>
+        <mc:Fallback xmlns="">
           <p:sp>
             <p:nvSpPr>
               <p:cNvPr id="30" name="TextBox 29">
@@ -22388,8 +22396,8 @@
           </p:sp>
         </mc:Fallback>
       </mc:AlternateContent>
-      <mc:AlternateContent xmlns:mc="http://schemas.openxmlformats.org/markup-compatibility/2006">
-        <mc:Choice xmlns:a14="http://schemas.microsoft.com/office/drawing/2010/main" Requires="a14">
+      <mc:AlternateContent xmlns:mc="http://schemas.openxmlformats.org/markup-compatibility/2006" xmlns:a14="http://schemas.microsoft.com/office/drawing/2010/main">
+        <mc:Choice Requires="a14">
           <p:sp>
             <p:nvSpPr>
               <p:cNvPr id="31" name="TextBox 30">
@@ -22464,7 +22472,7 @@
             </p:txBody>
           </p:sp>
         </mc:Choice>
-        <mc:Fallback>
+        <mc:Fallback xmlns="">
           <p:sp>
             <p:nvSpPr>
               <p:cNvPr id="31" name="TextBox 30">
@@ -22828,8 +22836,8 @@
           </a:p>
         </p:txBody>
       </p:sp>
-      <mc:AlternateContent xmlns:mc="http://schemas.openxmlformats.org/markup-compatibility/2006">
-        <mc:Choice xmlns:a14="http://schemas.microsoft.com/office/drawing/2010/main" Requires="a14">
+      <mc:AlternateContent xmlns:mc="http://schemas.openxmlformats.org/markup-compatibility/2006" xmlns:a14="http://schemas.microsoft.com/office/drawing/2010/main">
+        <mc:Choice Requires="a14">
           <p:sp>
             <p:nvSpPr>
               <p:cNvPr id="25" name="TextBox 24">
@@ -22883,7 +22891,7 @@
             </p:txBody>
           </p:sp>
         </mc:Choice>
-        <mc:Fallback>
+        <mc:Fallback xmlns="">
           <p:sp>
             <p:nvSpPr>
               <p:cNvPr id="25" name="TextBox 24">
@@ -23608,8 +23616,8 @@
           </a:p>
         </p:txBody>
       </p:sp>
-      <mc:AlternateContent xmlns:mc="http://schemas.openxmlformats.org/markup-compatibility/2006">
-        <mc:Choice xmlns:a14="http://schemas.microsoft.com/office/drawing/2010/main" Requires="a14">
+      <mc:AlternateContent xmlns:mc="http://schemas.openxmlformats.org/markup-compatibility/2006" xmlns:a14="http://schemas.microsoft.com/office/drawing/2010/main">
+        <mc:Choice Requires="a14">
           <p:sp>
             <p:nvSpPr>
               <p:cNvPr id="3" name="Content Placeholder 2">
@@ -24265,7 +24273,7 @@
             </p:txBody>
           </p:sp>
         </mc:Choice>
-        <mc:Fallback>
+        <mc:Fallback xmlns="">
           <p:sp>
             <p:nvSpPr>
               <p:cNvPr id="3" name="Content Placeholder 2">
@@ -27764,6 +27772,252 @@
   <p:cSld>
     <p:spTree>
       <p:nvGrpSpPr>
+        <p:cNvPr id="1" name="">
+          <a:extLst>
+            <a:ext uri="{FF2B5EF4-FFF2-40B4-BE49-F238E27FC236}">
+              <a16:creationId xmlns:a16="http://schemas.microsoft.com/office/drawing/2014/main" id="{7C277D27-9505-3EAB-A068-4199D37295CA}"/>
+            </a:ext>
+          </a:extLst>
+        </p:cNvPr>
+        <p:cNvGrpSpPr/>
+        <p:nvPr/>
+      </p:nvGrpSpPr>
+      <p:grpSpPr>
+        <a:xfrm>
+          <a:off x="0" y="0"/>
+          <a:ext cx="0" cy="0"/>
+          <a:chOff x="0" y="0"/>
+          <a:chExt cx="0" cy="0"/>
+        </a:xfrm>
+      </p:grpSpPr>
+      <p:sp>
+        <p:nvSpPr>
+          <p:cNvPr id="2" name="Title 1">
+            <a:extLst>
+              <a:ext uri="{FF2B5EF4-FFF2-40B4-BE49-F238E27FC236}">
+                <a16:creationId xmlns:a16="http://schemas.microsoft.com/office/drawing/2014/main" id="{3CCDC298-C64B-9123-7B97-71CE50CF7122}"/>
+              </a:ext>
+            </a:extLst>
+          </p:cNvPr>
+          <p:cNvSpPr>
+            <a:spLocks noGrp="1"/>
+          </p:cNvSpPr>
+          <p:nvPr>
+            <p:ph type="title"/>
+          </p:nvPr>
+        </p:nvSpPr>
+        <p:spPr/>
+        <p:txBody>
+          <a:bodyPr/>
+          <a:lstStyle/>
+          <a:p>
+            <a:r>
+              <a:rPr lang="en-US" dirty="0"/>
+              <a:t>Outline</a:t>
+            </a:r>
+          </a:p>
+        </p:txBody>
+      </p:sp>
+      <mc:AlternateContent xmlns:mc="http://schemas.openxmlformats.org/markup-compatibility/2006" xmlns:a14="http://schemas.microsoft.com/office/drawing/2010/main">
+        <mc:Choice Requires="a14">
+          <p:sp>
+            <p:nvSpPr>
+              <p:cNvPr id="3" name="Content Placeholder 2">
+                <a:extLst>
+                  <a:ext uri="{FF2B5EF4-FFF2-40B4-BE49-F238E27FC236}">
+                    <a16:creationId xmlns:a16="http://schemas.microsoft.com/office/drawing/2014/main" id="{E25025D8-61FF-CAA4-9C37-768130975BD7}"/>
+                  </a:ext>
+                </a:extLst>
+              </p:cNvPr>
+              <p:cNvSpPr>
+                <a:spLocks noGrp="1"/>
+              </p:cNvSpPr>
+              <p:nvPr>
+                <p:ph idx="1"/>
+              </p:nvPr>
+            </p:nvSpPr>
+            <p:spPr/>
+            <p:txBody>
+              <a:bodyPr>
+                <a:normAutofit/>
+              </a:bodyPr>
+              <a:lstStyle/>
+              <a:p>
+                <a14:m>
+                  <m:oMath xmlns:m="http://schemas.openxmlformats.org/officeDocument/2006/math">
+                    <m:r>
+                      <a:rPr lang="en-US" sz="2400" i="1" dirty="0" smtClean="0">
+                        <a:latin typeface="Cambria Math" panose="02040503050406030204" pitchFamily="18" charset="0"/>
+                      </a:rPr>
+                      <m:t>𝐾</m:t>
+                    </m:r>
+                  </m:oMath>
+                </a14:m>
+                <a:r>
+                  <a:rPr lang="en-US" sz="2400" dirty="0"/>
+                  <a:t>-Nearest Neighbors</a:t>
+                </a:r>
+              </a:p>
+              <a:p>
+                <a:r>
+                  <a:rPr lang="en-US" sz="2400" dirty="0"/>
+                  <a:t>Kernel Smoothing</a:t>
+                </a:r>
+              </a:p>
+              <a:p>
+                <a:r>
+                  <a:rPr lang="en-US" sz="2400" dirty="0"/>
+                  <a:t>Kernel Regression</a:t>
+                </a:r>
+              </a:p>
+              <a:p>
+                <a:r>
+                  <a:rPr lang="en-US" sz="2400" dirty="0"/>
+                  <a:t>Example with Climate Data</a:t>
+                </a:r>
+              </a:p>
+            </p:txBody>
+          </p:sp>
+        </mc:Choice>
+        <mc:Fallback xmlns="">
+          <p:sp>
+            <p:nvSpPr>
+              <p:cNvPr id="3" name="Content Placeholder 2">
+                <a:extLst>
+                  <a:ext uri="{FF2B5EF4-FFF2-40B4-BE49-F238E27FC236}">
+                    <a16:creationId xmlns:a16="http://schemas.microsoft.com/office/drawing/2014/main" id="{B8E8B71B-E1D2-B44C-D72D-91C26967D2B9}"/>
+                  </a:ext>
+                </a:extLst>
+              </p:cNvPr>
+              <p:cNvSpPr>
+                <a:spLocks noGrp="1" noRot="1" noChangeAspect="1" noMove="1" noResize="1" noEditPoints="1" noAdjustHandles="1" noChangeArrowheads="1" noChangeShapeType="1" noTextEdit="1"/>
+              </p:cNvSpPr>
+              <p:nvPr>
+                <p:ph idx="1"/>
+              </p:nvPr>
+            </p:nvSpPr>
+            <p:spPr>
+              <a:blipFill>
+                <a:blip r:embed="rId2"/>
+                <a:stretch>
+                  <a:fillRect l="-1697" t="-1972"/>
+                </a:stretch>
+              </a:blipFill>
+            </p:spPr>
+            <p:txBody>
+              <a:bodyPr/>
+              <a:lstStyle/>
+              <a:p>
+                <a:r>
+                  <a:rPr lang="en-US">
+                    <a:noFill/>
+                  </a:rPr>
+                  <a:t> </a:t>
+                </a:r>
+              </a:p>
+            </p:txBody>
+          </p:sp>
+        </mc:Fallback>
+      </mc:AlternateContent>
+      <p:sp>
+        <p:nvSpPr>
+          <p:cNvPr id="4" name="Slide Number Placeholder 3">
+            <a:extLst>
+              <a:ext uri="{FF2B5EF4-FFF2-40B4-BE49-F238E27FC236}">
+                <a16:creationId xmlns:a16="http://schemas.microsoft.com/office/drawing/2014/main" id="{3440B4A8-E175-5093-9FDD-8254D8BCEB97}"/>
+              </a:ext>
+            </a:extLst>
+          </p:cNvPr>
+          <p:cNvSpPr>
+            <a:spLocks noGrp="1"/>
+          </p:cNvSpPr>
+          <p:nvPr>
+            <p:ph type="sldNum" sz="quarter" idx="12"/>
+          </p:nvPr>
+        </p:nvSpPr>
+        <p:spPr/>
+        <p:txBody>
+          <a:bodyPr/>
+          <a:lstStyle/>
+          <a:p>
+            <a:fld id="{629637A9-119A-49DA-BD12-AAC58B377D80}" type="slidenum">
+              <a:rPr lang="en-US" smtClean="0"/>
+              <a:t>33</a:t>
+            </a:fld>
+            <a:endParaRPr lang="en-US" dirty="0"/>
+          </a:p>
+        </p:txBody>
+      </p:sp>
+      <p:sp>
+        <p:nvSpPr>
+          <p:cNvPr id="5" name="Arrow: Right 4">
+            <a:extLst>
+              <a:ext uri="{FF2B5EF4-FFF2-40B4-BE49-F238E27FC236}">
+                <a16:creationId xmlns:a16="http://schemas.microsoft.com/office/drawing/2014/main" id="{E16E0AC4-0423-8B83-0A4F-229DAE476D89}"/>
+              </a:ext>
+            </a:extLst>
+          </p:cNvPr>
+          <p:cNvSpPr/>
+          <p:nvPr/>
+        </p:nvSpPr>
+        <p:spPr>
+          <a:xfrm>
+            <a:off x="362779" y="2501051"/>
+            <a:ext cx="978408" cy="484632"/>
+          </a:xfrm>
+          <a:prstGeom prst="rightArrow">
+            <a:avLst/>
+          </a:prstGeom>
+          <a:solidFill>
+            <a:schemeClr val="tx2">
+              <a:lumMod val="60000"/>
+              <a:lumOff val="40000"/>
+            </a:schemeClr>
+          </a:solidFill>
+        </p:spPr>
+        <p:style>
+          <a:lnRef idx="2">
+            <a:schemeClr val="accent1">
+              <a:shade val="50000"/>
+            </a:schemeClr>
+          </a:lnRef>
+          <a:fillRef idx="1">
+            <a:schemeClr val="accent1"/>
+          </a:fillRef>
+          <a:effectRef idx="0">
+            <a:schemeClr val="accent1"/>
+          </a:effectRef>
+          <a:fontRef idx="minor">
+            <a:schemeClr val="lt1"/>
+          </a:fontRef>
+        </p:style>
+        <p:txBody>
+          <a:bodyPr rtlCol="0" anchor="ctr"/>
+          <a:lstStyle/>
+          <a:p>
+            <a:pPr algn="ctr"/>
+            <a:endParaRPr lang="en-US"/>
+          </a:p>
+        </p:txBody>
+      </p:sp>
+    </p:spTree>
+    <p:extLst>
+      <p:ext uri="{BB962C8B-B14F-4D97-AF65-F5344CB8AC3E}">
+        <p14:creationId xmlns:p14="http://schemas.microsoft.com/office/powerpoint/2010/main" val="1216057359"/>
+      </p:ext>
+    </p:extLst>
+  </p:cSld>
+  <p:clrMapOvr>
+    <a:masterClrMapping/>
+  </p:clrMapOvr>
+</p:sld>
+</file>
+
+<file path=ppt/slides/slide34.xml><?xml version="1.0" encoding="utf-8"?>
+<p:sld xmlns:a="http://schemas.openxmlformats.org/drawingml/2006/main" xmlns:r="http://schemas.openxmlformats.org/officeDocument/2006/relationships" xmlns:p="http://schemas.openxmlformats.org/presentationml/2006/main">
+  <p:cSld>
+    <p:spTree>
+      <p:nvGrpSpPr>
         <p:cNvPr id="1" name=""/>
         <p:cNvGrpSpPr/>
         <p:nvPr/>
@@ -27804,8 +28058,8 @@
           </a:p>
         </p:txBody>
       </p:sp>
-      <mc:AlternateContent xmlns:mc="http://schemas.openxmlformats.org/markup-compatibility/2006">
-        <mc:Choice xmlns:a14="http://schemas.microsoft.com/office/drawing/2010/main" Requires="a14">
+      <mc:AlternateContent xmlns:mc="http://schemas.openxmlformats.org/markup-compatibility/2006" xmlns:a14="http://schemas.microsoft.com/office/drawing/2010/main">
+        <mc:Choice Requires="a14">
           <p:sp>
             <p:nvSpPr>
               <p:cNvPr id="3" name="Content Placeholder 2">
@@ -28324,7 +28578,7 @@
             </p:txBody>
           </p:sp>
         </mc:Choice>
-        <mc:Fallback>
+        <mc:Fallback xmlns="">
           <p:sp>
             <p:nvSpPr>
               <p:cNvPr id="3" name="Content Placeholder 2">
@@ -28391,7 +28645,7 @@
           <a:p>
             <a:fld id="{629637A9-119A-49DA-BD12-AAC58B377D80}" type="slidenum">
               <a:rPr lang="en-US" smtClean="0"/>
-              <a:t>33</a:t>
+              <a:t>34</a:t>
             </a:fld>
             <a:endParaRPr lang="en-US" dirty="0"/>
           </a:p>
@@ -28535,7 +28789,7 @@
 </p:sld>
 </file>
 
-<file path=ppt/slides/slide34.xml><?xml version="1.0" encoding="utf-8"?>
+<file path=ppt/slides/slide35.xml><?xml version="1.0" encoding="utf-8"?>
 <p:sld xmlns:a="http://schemas.openxmlformats.org/drawingml/2006/main" xmlns:r="http://schemas.openxmlformats.org/officeDocument/2006/relationships" xmlns:p="http://schemas.openxmlformats.org/presentationml/2006/main">
   <p:cSld>
     <p:spTree>
@@ -28580,8 +28834,8 @@
           </a:p>
         </p:txBody>
       </p:sp>
-      <mc:AlternateContent xmlns:mc="http://schemas.openxmlformats.org/markup-compatibility/2006">
-        <mc:Choice xmlns:a14="http://schemas.microsoft.com/office/drawing/2010/main" Requires="a14">
+      <mc:AlternateContent xmlns:mc="http://schemas.openxmlformats.org/markup-compatibility/2006" xmlns:a14="http://schemas.microsoft.com/office/drawing/2010/main">
+        <mc:Choice Requires="a14">
           <p:sp>
             <p:nvSpPr>
               <p:cNvPr id="3" name="Content Placeholder 2">
@@ -30071,7 +30325,7 @@
             </p:txBody>
           </p:sp>
         </mc:Choice>
-        <mc:Fallback>
+        <mc:Fallback xmlns="">
           <p:sp>
             <p:nvSpPr>
               <p:cNvPr id="3" name="Content Placeholder 2">
@@ -30134,7 +30388,7 @@
           <a:p>
             <a:fld id="{629637A9-119A-49DA-BD12-AAC58B377D80}" type="slidenum">
               <a:rPr lang="en-US" smtClean="0"/>
-              <a:t>34</a:t>
+              <a:t>35</a:t>
             </a:fld>
             <a:endParaRPr lang="en-US" dirty="0"/>
           </a:p>
@@ -30153,7 +30407,7 @@
 </p:sld>
 </file>
 
-<file path=ppt/slides/slide35.xml><?xml version="1.0" encoding="utf-8"?>
+<file path=ppt/slides/slide36.xml><?xml version="1.0" encoding="utf-8"?>
 <p:sld xmlns:a="http://schemas.openxmlformats.org/drawingml/2006/main" xmlns:r="http://schemas.openxmlformats.org/officeDocument/2006/relationships" xmlns:p="http://schemas.openxmlformats.org/presentationml/2006/main">
   <p:cSld>
     <p:spTree>
@@ -30198,8 +30452,8 @@
           </a:p>
         </p:txBody>
       </p:sp>
-      <mc:AlternateContent xmlns:mc="http://schemas.openxmlformats.org/markup-compatibility/2006">
-        <mc:Choice xmlns:a14="http://schemas.microsoft.com/office/drawing/2010/main" Requires="a14">
+      <mc:AlternateContent xmlns:mc="http://schemas.openxmlformats.org/markup-compatibility/2006" xmlns:a14="http://schemas.microsoft.com/office/drawing/2010/main">
+        <mc:Choice Requires="a14">
           <p:sp>
             <p:nvSpPr>
               <p:cNvPr id="3" name="Content Placeholder 2">
@@ -30478,7 +30732,7 @@
                                 <m:limLow>
                                   <m:limLowPr>
                                     <m:ctrlPr>
-                                      <a:rPr lang="en-US" b="0" i="0" smtClean="0">
+                                      <a:rPr lang="en-US" b="0" i="1" smtClean="0">
                                         <a:latin typeface="Cambria Math" panose="02040503050406030204" pitchFamily="18" charset="0"/>
                                       </a:rPr>
                                     </m:ctrlPr>
@@ -31111,7 +31365,7 @@
             </p:txBody>
           </p:sp>
         </mc:Choice>
-        <mc:Fallback>
+        <mc:Fallback xmlns="">
           <p:sp>
             <p:nvSpPr>
               <p:cNvPr id="3" name="Content Placeholder 2">
@@ -31174,7 +31428,7 @@
           <a:p>
             <a:fld id="{629637A9-119A-49DA-BD12-AAC58B377D80}" type="slidenum">
               <a:rPr lang="en-US" smtClean="0"/>
-              <a:t>35</a:t>
+              <a:t>36</a:t>
             </a:fld>
             <a:endParaRPr lang="en-US" dirty="0"/>
           </a:p>
@@ -31193,7 +31447,7 @@
 </p:sld>
 </file>
 
-<file path=ppt/slides/slide36.xml><?xml version="1.0" encoding="utf-8"?>
+<file path=ppt/slides/slide37.xml><?xml version="1.0" encoding="utf-8"?>
 <p:sld xmlns:a="http://schemas.openxmlformats.org/drawingml/2006/main" xmlns:r="http://schemas.openxmlformats.org/officeDocument/2006/relationships" xmlns:p="http://schemas.openxmlformats.org/presentationml/2006/main">
   <p:cSld>
     <p:spTree>
@@ -31238,8 +31492,8 @@
           </a:p>
         </p:txBody>
       </p:sp>
-      <mc:AlternateContent xmlns:mc="http://schemas.openxmlformats.org/markup-compatibility/2006">
-        <mc:Choice xmlns:a14="http://schemas.microsoft.com/office/drawing/2010/main" Requires="a14">
+      <mc:AlternateContent xmlns:mc="http://schemas.openxmlformats.org/markup-compatibility/2006" xmlns:a14="http://schemas.microsoft.com/office/drawing/2010/main">
+        <mc:Choice Requires="a14">
           <p:sp>
             <p:nvSpPr>
               <p:cNvPr id="3" name="Content Placeholder 2">
@@ -31597,7 +31851,7 @@
             </p:txBody>
           </p:sp>
         </mc:Choice>
-        <mc:Fallback>
+        <mc:Fallback xmlns="">
           <p:sp>
             <p:nvSpPr>
               <p:cNvPr id="3" name="Content Placeholder 2">
@@ -31660,7 +31914,7 @@
           <a:p>
             <a:fld id="{629637A9-119A-49DA-BD12-AAC58B377D80}" type="slidenum">
               <a:rPr lang="en-US" smtClean="0"/>
-              <a:t>36</a:t>
+              <a:t>37</a:t>
             </a:fld>
             <a:endParaRPr lang="en-US" dirty="0"/>
           </a:p>
@@ -31679,7 +31933,7 @@
 </p:sld>
 </file>
 
-<file path=ppt/slides/slide37.xml><?xml version="1.0" encoding="utf-8"?>
+<file path=ppt/slides/slide38.xml><?xml version="1.0" encoding="utf-8"?>
 <p:sld xmlns:a="http://schemas.openxmlformats.org/drawingml/2006/main" xmlns:r="http://schemas.openxmlformats.org/officeDocument/2006/relationships" xmlns:p="http://schemas.openxmlformats.org/presentationml/2006/main">
   <p:cSld>
     <p:spTree>
@@ -31724,8 +31978,8 @@
           </a:p>
         </p:txBody>
       </p:sp>
-      <mc:AlternateContent xmlns:mc="http://schemas.openxmlformats.org/markup-compatibility/2006">
-        <mc:Choice xmlns:a14="http://schemas.microsoft.com/office/drawing/2010/main" Requires="a14">
+      <mc:AlternateContent xmlns:mc="http://schemas.openxmlformats.org/markup-compatibility/2006" xmlns:a14="http://schemas.microsoft.com/office/drawing/2010/main">
+        <mc:Choice Requires="a14">
           <p:sp>
             <p:nvSpPr>
               <p:cNvPr id="3" name="Content Placeholder 2">
@@ -32617,7 +32871,7 @@
                             <m:begChr m:val="["/>
                             <m:endChr m:val="]"/>
                             <m:ctrlPr>
-                              <a:rPr lang="en-US" b="0" i="0" smtClean="0">
+                              <a:rPr lang="en-US" b="0" i="1" smtClean="0">
                                 <a:latin typeface="Cambria Math" panose="02040503050406030204" pitchFamily="18" charset="0"/>
                               </a:rPr>
                             </m:ctrlPr>
@@ -33323,7 +33577,7 @@
                     <m:d>
                       <m:dPr>
                         <m:ctrlPr>
-                          <a:rPr lang="en-US" b="0" i="0" smtClean="0">
+                          <a:rPr lang="en-US" b="0" i="1" smtClean="0">
                             <a:latin typeface="Cambria Math" panose="02040503050406030204" pitchFamily="18" charset="0"/>
                           </a:rPr>
                         </m:ctrlPr>
@@ -33387,7 +33641,7 @@
             </p:txBody>
           </p:sp>
         </mc:Choice>
-        <mc:Fallback>
+        <mc:Fallback xmlns="">
           <p:sp>
             <p:nvSpPr>
               <p:cNvPr id="3" name="Content Placeholder 2">
@@ -33450,7 +33704,7 @@
           <a:p>
             <a:fld id="{629637A9-119A-49DA-BD12-AAC58B377D80}" type="slidenum">
               <a:rPr lang="en-US" smtClean="0"/>
-              <a:t>37</a:t>
+              <a:t>38</a:t>
             </a:fld>
             <a:endParaRPr lang="en-US" dirty="0"/>
           </a:p>
@@ -33469,7 +33723,7 @@
 </p:sld>
 </file>
 
-<file path=ppt/slides/slide38.xml><?xml version="1.0" encoding="utf-8"?>
+<file path=ppt/slides/slide39.xml><?xml version="1.0" encoding="utf-8"?>
 <p:sld xmlns:a="http://schemas.openxmlformats.org/drawingml/2006/main" xmlns:r="http://schemas.openxmlformats.org/officeDocument/2006/relationships" xmlns:p="http://schemas.openxmlformats.org/presentationml/2006/main">
   <p:cSld>
     <p:spTree>
@@ -33514,8 +33768,8 @@
           </a:p>
         </p:txBody>
       </p:sp>
-      <mc:AlternateContent xmlns:mc="http://schemas.openxmlformats.org/markup-compatibility/2006">
-        <mc:Choice xmlns:a14="http://schemas.microsoft.com/office/drawing/2010/main" Requires="a14">
+      <mc:AlternateContent xmlns:mc="http://schemas.openxmlformats.org/markup-compatibility/2006" xmlns:a14="http://schemas.microsoft.com/office/drawing/2010/main">
+        <mc:Choice Requires="a14">
           <p:sp>
             <p:nvSpPr>
               <p:cNvPr id="3" name="Content Placeholder 2">
@@ -34347,7 +34601,7 @@
             </p:txBody>
           </p:sp>
         </mc:Choice>
-        <mc:Fallback>
+        <mc:Fallback xmlns="">
           <p:sp>
             <p:nvSpPr>
               <p:cNvPr id="3" name="Content Placeholder 2">
@@ -34410,7 +34664,7 @@
           <a:p>
             <a:fld id="{629637A9-119A-49DA-BD12-AAC58B377D80}" type="slidenum">
               <a:rPr lang="en-US" smtClean="0"/>
-              <a:t>38</a:t>
+              <a:t>39</a:t>
             </a:fld>
             <a:endParaRPr lang="en-US" dirty="0"/>
           </a:p>
@@ -34420,252 +34674,6 @@
     <p:extLst>
       <p:ext uri="{BB962C8B-B14F-4D97-AF65-F5344CB8AC3E}">
         <p14:creationId xmlns:p14="http://schemas.microsoft.com/office/powerpoint/2010/main" val="3906613497"/>
-      </p:ext>
-    </p:extLst>
-  </p:cSld>
-  <p:clrMapOvr>
-    <a:masterClrMapping/>
-  </p:clrMapOvr>
-</p:sld>
-</file>
-
-<file path=ppt/slides/slide39.xml><?xml version="1.0" encoding="utf-8"?>
-<p:sld xmlns:a="http://schemas.openxmlformats.org/drawingml/2006/main" xmlns:r="http://schemas.openxmlformats.org/officeDocument/2006/relationships" xmlns:p="http://schemas.openxmlformats.org/presentationml/2006/main">
-  <p:cSld>
-    <p:spTree>
-      <p:nvGrpSpPr>
-        <p:cNvPr id="1" name="">
-          <a:extLst>
-            <a:ext uri="{FF2B5EF4-FFF2-40B4-BE49-F238E27FC236}">
-              <a16:creationId xmlns:a16="http://schemas.microsoft.com/office/drawing/2014/main" id="{49F37931-2F46-DCD2-2B7C-DEC50EB1CCF1}"/>
-            </a:ext>
-          </a:extLst>
-        </p:cNvPr>
-        <p:cNvGrpSpPr/>
-        <p:nvPr/>
-      </p:nvGrpSpPr>
-      <p:grpSpPr>
-        <a:xfrm>
-          <a:off x="0" y="0"/>
-          <a:ext cx="0" cy="0"/>
-          <a:chOff x="0" y="0"/>
-          <a:chExt cx="0" cy="0"/>
-        </a:xfrm>
-      </p:grpSpPr>
-      <p:sp>
-        <p:nvSpPr>
-          <p:cNvPr id="2" name="Title 1">
-            <a:extLst>
-              <a:ext uri="{FF2B5EF4-FFF2-40B4-BE49-F238E27FC236}">
-                <a16:creationId xmlns:a16="http://schemas.microsoft.com/office/drawing/2014/main" id="{DBEA7661-FF0E-E07F-791E-6D4B41491B4E}"/>
-              </a:ext>
-            </a:extLst>
-          </p:cNvPr>
-          <p:cNvSpPr>
-            <a:spLocks noGrp="1"/>
-          </p:cNvSpPr>
-          <p:nvPr>
-            <p:ph type="title"/>
-          </p:nvPr>
-        </p:nvSpPr>
-        <p:spPr/>
-        <p:txBody>
-          <a:bodyPr/>
-          <a:lstStyle/>
-          <a:p>
-            <a:r>
-              <a:rPr lang="en-US" dirty="0"/>
-              <a:t>Outline</a:t>
-            </a:r>
-          </a:p>
-        </p:txBody>
-      </p:sp>
-      <mc:AlternateContent xmlns:mc="http://schemas.openxmlformats.org/markup-compatibility/2006">
-        <mc:Choice xmlns:a14="http://schemas.microsoft.com/office/drawing/2010/main" Requires="a14">
-          <p:sp>
-            <p:nvSpPr>
-              <p:cNvPr id="3" name="Content Placeholder 2">
-                <a:extLst>
-                  <a:ext uri="{FF2B5EF4-FFF2-40B4-BE49-F238E27FC236}">
-                    <a16:creationId xmlns:a16="http://schemas.microsoft.com/office/drawing/2014/main" id="{FAFB5C46-03EB-D61C-7A64-73B756D6BAE0}"/>
-                  </a:ext>
-                </a:extLst>
-              </p:cNvPr>
-              <p:cNvSpPr>
-                <a:spLocks noGrp="1"/>
-              </p:cNvSpPr>
-              <p:nvPr>
-                <p:ph idx="1"/>
-              </p:nvPr>
-            </p:nvSpPr>
-            <p:spPr/>
-            <p:txBody>
-              <a:bodyPr>
-                <a:normAutofit/>
-              </a:bodyPr>
-              <a:lstStyle/>
-              <a:p>
-                <a14:m>
-                  <m:oMath xmlns:m="http://schemas.openxmlformats.org/officeDocument/2006/math">
-                    <m:r>
-                      <a:rPr lang="en-US" sz="2400" i="1" dirty="0" smtClean="0">
-                        <a:latin typeface="Cambria Math" panose="02040503050406030204" pitchFamily="18" charset="0"/>
-                      </a:rPr>
-                      <m:t>𝐾</m:t>
-                    </m:r>
-                  </m:oMath>
-                </a14:m>
-                <a:r>
-                  <a:rPr lang="en-US" sz="2400" dirty="0"/>
-                  <a:t>-Nearest Neighbors</a:t>
-                </a:r>
-              </a:p>
-              <a:p>
-                <a:r>
-                  <a:rPr lang="en-US" sz="2400" dirty="0"/>
-                  <a:t>Kernel Smoothing</a:t>
-                </a:r>
-              </a:p>
-              <a:p>
-                <a:r>
-                  <a:rPr lang="en-US" sz="2400" dirty="0"/>
-                  <a:t>Kernel Regression</a:t>
-                </a:r>
-              </a:p>
-              <a:p>
-                <a:r>
-                  <a:rPr lang="en-US" sz="2400" dirty="0"/>
-                  <a:t>Example with Climate Data</a:t>
-                </a:r>
-              </a:p>
-            </p:txBody>
-          </p:sp>
-        </mc:Choice>
-        <mc:Fallback>
-          <p:sp>
-            <p:nvSpPr>
-              <p:cNvPr id="3" name="Content Placeholder 2">
-                <a:extLst>
-                  <a:ext uri="{FF2B5EF4-FFF2-40B4-BE49-F238E27FC236}">
-                    <a16:creationId xmlns:a16="http://schemas.microsoft.com/office/drawing/2014/main" id="{FAFB5C46-03EB-D61C-7A64-73B756D6BAE0}"/>
-                  </a:ext>
-                </a:extLst>
-              </p:cNvPr>
-              <p:cNvSpPr>
-                <a:spLocks noGrp="1" noRot="1" noChangeAspect="1" noMove="1" noResize="1" noEditPoints="1" noAdjustHandles="1" noChangeArrowheads="1" noChangeShapeType="1" noTextEdit="1"/>
-              </p:cNvSpPr>
-              <p:nvPr>
-                <p:ph idx="1"/>
-              </p:nvPr>
-            </p:nvSpPr>
-            <p:spPr>
-              <a:blipFill>
-                <a:blip r:embed="rId2"/>
-                <a:stretch>
-                  <a:fillRect l="-1697" t="-1972"/>
-                </a:stretch>
-              </a:blipFill>
-            </p:spPr>
-            <p:txBody>
-              <a:bodyPr/>
-              <a:lstStyle/>
-              <a:p>
-                <a:r>
-                  <a:rPr lang="en-US">
-                    <a:noFill/>
-                  </a:rPr>
-                  <a:t> </a:t>
-                </a:r>
-              </a:p>
-            </p:txBody>
-          </p:sp>
-        </mc:Fallback>
-      </mc:AlternateContent>
-      <p:sp>
-        <p:nvSpPr>
-          <p:cNvPr id="4" name="Slide Number Placeholder 3">
-            <a:extLst>
-              <a:ext uri="{FF2B5EF4-FFF2-40B4-BE49-F238E27FC236}">
-                <a16:creationId xmlns:a16="http://schemas.microsoft.com/office/drawing/2014/main" id="{8D8B3DDF-2DAF-D8A8-24D9-DBE214DD4D1B}"/>
-              </a:ext>
-            </a:extLst>
-          </p:cNvPr>
-          <p:cNvSpPr>
-            <a:spLocks noGrp="1"/>
-          </p:cNvSpPr>
-          <p:nvPr>
-            <p:ph type="sldNum" sz="quarter" idx="12"/>
-          </p:nvPr>
-        </p:nvSpPr>
-        <p:spPr/>
-        <p:txBody>
-          <a:bodyPr/>
-          <a:lstStyle/>
-          <a:p>
-            <a:fld id="{629637A9-119A-49DA-BD12-AAC58B377D80}" type="slidenum">
-              <a:rPr lang="en-US" smtClean="0"/>
-              <a:t>39</a:t>
-            </a:fld>
-            <a:endParaRPr lang="en-US" dirty="0"/>
-          </a:p>
-        </p:txBody>
-      </p:sp>
-      <p:sp>
-        <p:nvSpPr>
-          <p:cNvPr id="5" name="Arrow: Right 4">
-            <a:extLst>
-              <a:ext uri="{FF2B5EF4-FFF2-40B4-BE49-F238E27FC236}">
-                <a16:creationId xmlns:a16="http://schemas.microsoft.com/office/drawing/2014/main" id="{CA444FE1-1337-672C-B3A4-AE7F41D876F4}"/>
-              </a:ext>
-            </a:extLst>
-          </p:cNvPr>
-          <p:cNvSpPr/>
-          <p:nvPr/>
-        </p:nvSpPr>
-        <p:spPr>
-          <a:xfrm>
-            <a:off x="367639" y="3028300"/>
-            <a:ext cx="978408" cy="484632"/>
-          </a:xfrm>
-          <a:prstGeom prst="rightArrow">
-            <a:avLst/>
-          </a:prstGeom>
-          <a:solidFill>
-            <a:schemeClr val="tx2">
-              <a:lumMod val="60000"/>
-              <a:lumOff val="40000"/>
-            </a:schemeClr>
-          </a:solidFill>
-        </p:spPr>
-        <p:style>
-          <a:lnRef idx="2">
-            <a:schemeClr val="accent1">
-              <a:shade val="50000"/>
-            </a:schemeClr>
-          </a:lnRef>
-          <a:fillRef idx="1">
-            <a:schemeClr val="accent1"/>
-          </a:fillRef>
-          <a:effectRef idx="0">
-            <a:schemeClr val="accent1"/>
-          </a:effectRef>
-          <a:fontRef idx="minor">
-            <a:schemeClr val="lt1"/>
-          </a:fontRef>
-        </p:style>
-        <p:txBody>
-          <a:bodyPr rtlCol="0" anchor="ctr"/>
-          <a:lstStyle/>
-          <a:p>
-            <a:pPr algn="ctr"/>
-            <a:endParaRPr lang="en-US"/>
-          </a:p>
-        </p:txBody>
-      </p:sp>
-    </p:spTree>
-    <p:extLst>
-      <p:ext uri="{BB962C8B-B14F-4D97-AF65-F5344CB8AC3E}">
-        <p14:creationId xmlns:p14="http://schemas.microsoft.com/office/powerpoint/2010/main" val="2578276210"/>
       </p:ext>
     </p:extLst>
   </p:cSld>
@@ -34714,8 +34722,8 @@
           </a:p>
         </p:txBody>
       </p:sp>
-      <mc:AlternateContent xmlns:mc="http://schemas.openxmlformats.org/markup-compatibility/2006">
-        <mc:Choice xmlns:a14="http://schemas.microsoft.com/office/drawing/2010/main" Requires="a14">
+      <mc:AlternateContent xmlns:mc="http://schemas.openxmlformats.org/markup-compatibility/2006" xmlns:a14="http://schemas.microsoft.com/office/drawing/2010/main">
+        <mc:Choice Requires="a14">
           <p:sp>
             <p:nvSpPr>
               <p:cNvPr id="3" name="Content Placeholder 2"/>
@@ -34769,7 +34777,7 @@
             </p:txBody>
           </p:sp>
         </mc:Choice>
-        <mc:Fallback>
+        <mc:Fallback xmlns="">
           <p:sp>
             <p:nvSpPr>
               <p:cNvPr id="3" name="Content Placeholder 2"/>
@@ -34886,6 +34894,252 @@
 </file>
 
 <file path=ppt/slides/slide40.xml><?xml version="1.0" encoding="utf-8"?>
+<p:sld xmlns:a="http://schemas.openxmlformats.org/drawingml/2006/main" xmlns:r="http://schemas.openxmlformats.org/officeDocument/2006/relationships" xmlns:p="http://schemas.openxmlformats.org/presentationml/2006/main">
+  <p:cSld>
+    <p:spTree>
+      <p:nvGrpSpPr>
+        <p:cNvPr id="1" name="">
+          <a:extLst>
+            <a:ext uri="{FF2B5EF4-FFF2-40B4-BE49-F238E27FC236}">
+              <a16:creationId xmlns:a16="http://schemas.microsoft.com/office/drawing/2014/main" id="{49F37931-2F46-DCD2-2B7C-DEC50EB1CCF1}"/>
+            </a:ext>
+          </a:extLst>
+        </p:cNvPr>
+        <p:cNvGrpSpPr/>
+        <p:nvPr/>
+      </p:nvGrpSpPr>
+      <p:grpSpPr>
+        <a:xfrm>
+          <a:off x="0" y="0"/>
+          <a:ext cx="0" cy="0"/>
+          <a:chOff x="0" y="0"/>
+          <a:chExt cx="0" cy="0"/>
+        </a:xfrm>
+      </p:grpSpPr>
+      <p:sp>
+        <p:nvSpPr>
+          <p:cNvPr id="2" name="Title 1">
+            <a:extLst>
+              <a:ext uri="{FF2B5EF4-FFF2-40B4-BE49-F238E27FC236}">
+                <a16:creationId xmlns:a16="http://schemas.microsoft.com/office/drawing/2014/main" id="{DBEA7661-FF0E-E07F-791E-6D4B41491B4E}"/>
+              </a:ext>
+            </a:extLst>
+          </p:cNvPr>
+          <p:cNvSpPr>
+            <a:spLocks noGrp="1"/>
+          </p:cNvSpPr>
+          <p:nvPr>
+            <p:ph type="title"/>
+          </p:nvPr>
+        </p:nvSpPr>
+        <p:spPr/>
+        <p:txBody>
+          <a:bodyPr/>
+          <a:lstStyle/>
+          <a:p>
+            <a:r>
+              <a:rPr lang="en-US" dirty="0"/>
+              <a:t>Outline</a:t>
+            </a:r>
+          </a:p>
+        </p:txBody>
+      </p:sp>
+      <mc:AlternateContent xmlns:mc="http://schemas.openxmlformats.org/markup-compatibility/2006" xmlns:a14="http://schemas.microsoft.com/office/drawing/2010/main">
+        <mc:Choice Requires="a14">
+          <p:sp>
+            <p:nvSpPr>
+              <p:cNvPr id="3" name="Content Placeholder 2">
+                <a:extLst>
+                  <a:ext uri="{FF2B5EF4-FFF2-40B4-BE49-F238E27FC236}">
+                    <a16:creationId xmlns:a16="http://schemas.microsoft.com/office/drawing/2014/main" id="{FAFB5C46-03EB-D61C-7A64-73B756D6BAE0}"/>
+                  </a:ext>
+                </a:extLst>
+              </p:cNvPr>
+              <p:cNvSpPr>
+                <a:spLocks noGrp="1"/>
+              </p:cNvSpPr>
+              <p:nvPr>
+                <p:ph idx="1"/>
+              </p:nvPr>
+            </p:nvSpPr>
+            <p:spPr/>
+            <p:txBody>
+              <a:bodyPr>
+                <a:normAutofit/>
+              </a:bodyPr>
+              <a:lstStyle/>
+              <a:p>
+                <a14:m>
+                  <m:oMath xmlns:m="http://schemas.openxmlformats.org/officeDocument/2006/math">
+                    <m:r>
+                      <a:rPr lang="en-US" sz="2400" i="1" dirty="0" smtClean="0">
+                        <a:latin typeface="Cambria Math" panose="02040503050406030204" pitchFamily="18" charset="0"/>
+                      </a:rPr>
+                      <m:t>𝐾</m:t>
+                    </m:r>
+                  </m:oMath>
+                </a14:m>
+                <a:r>
+                  <a:rPr lang="en-US" sz="2400" dirty="0"/>
+                  <a:t>-Nearest Neighbors</a:t>
+                </a:r>
+              </a:p>
+              <a:p>
+                <a:r>
+                  <a:rPr lang="en-US" sz="2400" dirty="0"/>
+                  <a:t>Kernel Smoothing</a:t>
+                </a:r>
+              </a:p>
+              <a:p>
+                <a:r>
+                  <a:rPr lang="en-US" sz="2400" dirty="0"/>
+                  <a:t>Kernel Regression</a:t>
+                </a:r>
+              </a:p>
+              <a:p>
+                <a:r>
+                  <a:rPr lang="en-US" sz="2400" dirty="0"/>
+                  <a:t>Example with Climate Data</a:t>
+                </a:r>
+              </a:p>
+            </p:txBody>
+          </p:sp>
+        </mc:Choice>
+        <mc:Fallback xmlns="">
+          <p:sp>
+            <p:nvSpPr>
+              <p:cNvPr id="3" name="Content Placeholder 2">
+                <a:extLst>
+                  <a:ext uri="{FF2B5EF4-FFF2-40B4-BE49-F238E27FC236}">
+                    <a16:creationId xmlns:a16="http://schemas.microsoft.com/office/drawing/2014/main" id="{FAFB5C46-03EB-D61C-7A64-73B756D6BAE0}"/>
+                  </a:ext>
+                </a:extLst>
+              </p:cNvPr>
+              <p:cNvSpPr>
+                <a:spLocks noGrp="1" noRot="1" noChangeAspect="1" noMove="1" noResize="1" noEditPoints="1" noAdjustHandles="1" noChangeArrowheads="1" noChangeShapeType="1" noTextEdit="1"/>
+              </p:cNvSpPr>
+              <p:nvPr>
+                <p:ph idx="1"/>
+              </p:nvPr>
+            </p:nvSpPr>
+            <p:spPr>
+              <a:blipFill>
+                <a:blip r:embed="rId2"/>
+                <a:stretch>
+                  <a:fillRect l="-1697" t="-1972"/>
+                </a:stretch>
+              </a:blipFill>
+            </p:spPr>
+            <p:txBody>
+              <a:bodyPr/>
+              <a:lstStyle/>
+              <a:p>
+                <a:r>
+                  <a:rPr lang="en-US">
+                    <a:noFill/>
+                  </a:rPr>
+                  <a:t> </a:t>
+                </a:r>
+              </a:p>
+            </p:txBody>
+          </p:sp>
+        </mc:Fallback>
+      </mc:AlternateContent>
+      <p:sp>
+        <p:nvSpPr>
+          <p:cNvPr id="4" name="Slide Number Placeholder 3">
+            <a:extLst>
+              <a:ext uri="{FF2B5EF4-FFF2-40B4-BE49-F238E27FC236}">
+                <a16:creationId xmlns:a16="http://schemas.microsoft.com/office/drawing/2014/main" id="{8D8B3DDF-2DAF-D8A8-24D9-DBE214DD4D1B}"/>
+              </a:ext>
+            </a:extLst>
+          </p:cNvPr>
+          <p:cNvSpPr>
+            <a:spLocks noGrp="1"/>
+          </p:cNvSpPr>
+          <p:nvPr>
+            <p:ph type="sldNum" sz="quarter" idx="12"/>
+          </p:nvPr>
+        </p:nvSpPr>
+        <p:spPr/>
+        <p:txBody>
+          <a:bodyPr/>
+          <a:lstStyle/>
+          <a:p>
+            <a:fld id="{629637A9-119A-49DA-BD12-AAC58B377D80}" type="slidenum">
+              <a:rPr lang="en-US" smtClean="0"/>
+              <a:t>40</a:t>
+            </a:fld>
+            <a:endParaRPr lang="en-US" dirty="0"/>
+          </a:p>
+        </p:txBody>
+      </p:sp>
+      <p:sp>
+        <p:nvSpPr>
+          <p:cNvPr id="5" name="Arrow: Right 4">
+            <a:extLst>
+              <a:ext uri="{FF2B5EF4-FFF2-40B4-BE49-F238E27FC236}">
+                <a16:creationId xmlns:a16="http://schemas.microsoft.com/office/drawing/2014/main" id="{CA444FE1-1337-672C-B3A4-AE7F41D876F4}"/>
+              </a:ext>
+            </a:extLst>
+          </p:cNvPr>
+          <p:cNvSpPr/>
+          <p:nvPr/>
+        </p:nvSpPr>
+        <p:spPr>
+          <a:xfrm>
+            <a:off x="367639" y="3028300"/>
+            <a:ext cx="978408" cy="484632"/>
+          </a:xfrm>
+          <a:prstGeom prst="rightArrow">
+            <a:avLst/>
+          </a:prstGeom>
+          <a:solidFill>
+            <a:schemeClr val="tx2">
+              <a:lumMod val="60000"/>
+              <a:lumOff val="40000"/>
+            </a:schemeClr>
+          </a:solidFill>
+        </p:spPr>
+        <p:style>
+          <a:lnRef idx="2">
+            <a:schemeClr val="accent1">
+              <a:shade val="50000"/>
+            </a:schemeClr>
+          </a:lnRef>
+          <a:fillRef idx="1">
+            <a:schemeClr val="accent1"/>
+          </a:fillRef>
+          <a:effectRef idx="0">
+            <a:schemeClr val="accent1"/>
+          </a:effectRef>
+          <a:fontRef idx="minor">
+            <a:schemeClr val="lt1"/>
+          </a:fontRef>
+        </p:style>
+        <p:txBody>
+          <a:bodyPr rtlCol="0" anchor="ctr"/>
+          <a:lstStyle/>
+          <a:p>
+            <a:pPr algn="ctr"/>
+            <a:endParaRPr lang="en-US"/>
+          </a:p>
+        </p:txBody>
+      </p:sp>
+    </p:spTree>
+    <p:extLst>
+      <p:ext uri="{BB962C8B-B14F-4D97-AF65-F5344CB8AC3E}">
+        <p14:creationId xmlns:p14="http://schemas.microsoft.com/office/powerpoint/2010/main" val="2578276210"/>
+      </p:ext>
+    </p:extLst>
+  </p:cSld>
+  <p:clrMapOvr>
+    <a:masterClrMapping/>
+  </p:clrMapOvr>
+</p:sld>
+</file>
+
+<file path=ppt/slides/slide41.xml><?xml version="1.0" encoding="utf-8"?>
 <p:sld xmlns:a="http://schemas.openxmlformats.org/drawingml/2006/main" xmlns:r="http://schemas.openxmlformats.org/officeDocument/2006/relationships" xmlns:p="http://schemas.openxmlformats.org/presentationml/2006/main">
   <p:cSld>
     <p:spTree>
@@ -35012,7 +35266,7 @@
           <a:p>
             <a:fld id="{629637A9-119A-49DA-BD12-AAC58B377D80}" type="slidenum">
               <a:rPr lang="en-US" smtClean="0"/>
-              <a:t>40</a:t>
+              <a:t>41</a:t>
             </a:fld>
             <a:endParaRPr lang="en-US" dirty="0"/>
           </a:p>
@@ -35091,7 +35345,7 @@
 </p:sld>
 </file>
 
-<file path=ppt/slides/slide41.xml><?xml version="1.0" encoding="utf-8"?>
+<file path=ppt/slides/slide42.xml><?xml version="1.0" encoding="utf-8"?>
 <p:sld xmlns:a="http://schemas.openxmlformats.org/drawingml/2006/main" xmlns:r="http://schemas.openxmlformats.org/officeDocument/2006/relationships" xmlns:p="http://schemas.openxmlformats.org/presentationml/2006/main">
   <p:cSld>
     <p:spTree>
@@ -35250,7 +35504,7 @@
           <a:p>
             <a:fld id="{629637A9-119A-49DA-BD12-AAC58B377D80}" type="slidenum">
               <a:rPr lang="en-US" smtClean="0"/>
-              <a:t>41</a:t>
+              <a:t>42</a:t>
             </a:fld>
             <a:endParaRPr lang="en-US" dirty="0"/>
           </a:p>
@@ -35381,7 +35635,7 @@
 </p:sld>
 </file>
 
-<file path=ppt/slides/slide42.xml><?xml version="1.0" encoding="utf-8"?>
+<file path=ppt/slides/slide43.xml><?xml version="1.0" encoding="utf-8"?>
 <p:sld xmlns:a="http://schemas.openxmlformats.org/drawingml/2006/main" xmlns:r="http://schemas.openxmlformats.org/officeDocument/2006/relationships" xmlns:p="http://schemas.openxmlformats.org/presentationml/2006/main">
   <p:cSld>
     <p:spTree>
@@ -35524,7 +35778,7 @@
           <a:p>
             <a:fld id="{629637A9-119A-49DA-BD12-AAC58B377D80}" type="slidenum">
               <a:rPr lang="en-US" smtClean="0"/>
-              <a:t>42</a:t>
+              <a:t>43</a:t>
             </a:fld>
             <a:endParaRPr lang="en-US" dirty="0"/>
           </a:p>
@@ -35573,7 +35827,7 @@
 </p:sld>
 </file>
 
-<file path=ppt/slides/slide43.xml><?xml version="1.0" encoding="utf-8"?>
+<file path=ppt/slides/slide44.xml><?xml version="1.0" encoding="utf-8"?>
 <p:sld xmlns:a="http://schemas.openxmlformats.org/drawingml/2006/main" xmlns:r="http://schemas.openxmlformats.org/officeDocument/2006/relationships" xmlns:p="http://schemas.openxmlformats.org/presentationml/2006/main">
   <p:cSld>
     <p:spTree>
@@ -35680,7 +35934,7 @@
           <a:p>
             <a:fld id="{629637A9-119A-49DA-BD12-AAC58B377D80}" type="slidenum">
               <a:rPr lang="en-US" smtClean="0"/>
-              <a:t>43</a:t>
+              <a:t>44</a:t>
             </a:fld>
             <a:endParaRPr lang="en-US" dirty="0"/>
           </a:p>
@@ -35759,7 +36013,7 @@
 </p:sld>
 </file>
 
-<file path=ppt/slides/slide44.xml><?xml version="1.0" encoding="utf-8"?>
+<file path=ppt/slides/slide45.xml><?xml version="1.0" encoding="utf-8"?>
 <p:sld xmlns:a="http://schemas.openxmlformats.org/drawingml/2006/main" xmlns:r="http://schemas.openxmlformats.org/officeDocument/2006/relationships" xmlns:p="http://schemas.openxmlformats.org/presentationml/2006/main">
   <p:cSld>
     <p:spTree>
@@ -35810,8 +36064,8 @@
           </a:p>
         </p:txBody>
       </p:sp>
-      <mc:AlternateContent xmlns:mc="http://schemas.openxmlformats.org/markup-compatibility/2006">
-        <mc:Choice xmlns:a14="http://schemas.microsoft.com/office/drawing/2010/main" Requires="a14">
+      <mc:AlternateContent xmlns:mc="http://schemas.openxmlformats.org/markup-compatibility/2006" xmlns:a14="http://schemas.microsoft.com/office/drawing/2010/main">
+        <mc:Choice Requires="a14">
           <p:sp>
             <p:nvSpPr>
               <p:cNvPr id="3" name="Content Placeholder 2">
@@ -35918,7 +36172,7 @@
             </p:txBody>
           </p:sp>
         </mc:Choice>
-        <mc:Fallback>
+        <mc:Fallback xmlns="">
           <p:sp>
             <p:nvSpPr>
               <p:cNvPr id="3" name="Content Placeholder 2">
@@ -35981,7 +36235,7 @@
           <a:p>
             <a:fld id="{629637A9-119A-49DA-BD12-AAC58B377D80}" type="slidenum">
               <a:rPr lang="en-US" smtClean="0"/>
-              <a:t>44</a:t>
+              <a:t>45</a:t>
             </a:fld>
             <a:endParaRPr lang="en-US" dirty="0"/>
           </a:p>
@@ -36030,7 +36284,7 @@
 </p:sld>
 </file>
 
-<file path=ppt/slides/slide45.xml><?xml version="1.0" encoding="utf-8"?>
+<file path=ppt/slides/slide46.xml><?xml version="1.0" encoding="utf-8"?>
 <p:sld xmlns:a="http://schemas.openxmlformats.org/drawingml/2006/main" xmlns:r="http://schemas.openxmlformats.org/officeDocument/2006/relationships" xmlns:p="http://schemas.openxmlformats.org/presentationml/2006/main">
   <p:cSld>
     <p:spTree>
@@ -36075,8 +36329,8 @@
           </a:p>
         </p:txBody>
       </p:sp>
-      <mc:AlternateContent xmlns:mc="http://schemas.openxmlformats.org/markup-compatibility/2006">
-        <mc:Choice xmlns:a14="http://schemas.microsoft.com/office/drawing/2010/main" Requires="a14">
+      <mc:AlternateContent xmlns:mc="http://schemas.openxmlformats.org/markup-compatibility/2006" xmlns:a14="http://schemas.microsoft.com/office/drawing/2010/main">
+        <mc:Choice Requires="a14">
           <p:sp>
             <p:nvSpPr>
               <p:cNvPr id="3" name="Content Placeholder 2">
@@ -36179,7 +36433,7 @@
             </p:txBody>
           </p:sp>
         </mc:Choice>
-        <mc:Fallback>
+        <mc:Fallback xmlns="">
           <p:sp>
             <p:nvSpPr>
               <p:cNvPr id="3" name="Content Placeholder 2">
@@ -36242,7 +36496,7 @@
           <a:p>
             <a:fld id="{629637A9-119A-49DA-BD12-AAC58B377D80}" type="slidenum">
               <a:rPr lang="en-US" smtClean="0"/>
-              <a:t>45</a:t>
+              <a:t>46</a:t>
             </a:fld>
             <a:endParaRPr lang="en-US" dirty="0"/>
           </a:p>
@@ -36291,7 +36545,7 @@
 </p:sld>
 </file>
 
-<file path=ppt/slides/slide46.xml><?xml version="1.0" encoding="utf-8"?>
+<file path=ppt/slides/slide47.xml><?xml version="1.0" encoding="utf-8"?>
 <p:sld xmlns:a="http://schemas.openxmlformats.org/drawingml/2006/main" xmlns:r="http://schemas.openxmlformats.org/officeDocument/2006/relationships" xmlns:p="http://schemas.openxmlformats.org/presentationml/2006/main">
   <p:cSld>
     <p:spTree>
@@ -36308,8 +36562,8 @@
           <a:chExt cx="0" cy="0"/>
         </a:xfrm>
       </p:grpSpPr>
-      <mc:AlternateContent xmlns:mc="http://schemas.openxmlformats.org/markup-compatibility/2006">
-        <mc:Choice xmlns:a14="http://schemas.microsoft.com/office/drawing/2010/main" Requires="a14">
+      <mc:AlternateContent xmlns:mc="http://schemas.openxmlformats.org/markup-compatibility/2006" xmlns:a14="http://schemas.microsoft.com/office/drawing/2010/main">
+        <mc:Choice Requires="a14">
           <p:sp>
             <p:nvSpPr>
               <p:cNvPr id="2" name="Title 1">
@@ -36350,7 +36604,7 @@
             </p:txBody>
           </p:sp>
         </mc:Choice>
-        <mc:Fallback>
+        <mc:Fallback xmlns="">
           <p:sp>
             <p:nvSpPr>
               <p:cNvPr id="2" name="Title 1">
@@ -36390,8 +36644,8 @@
           </p:sp>
         </mc:Fallback>
       </mc:AlternateContent>
-      <mc:AlternateContent xmlns:mc="http://schemas.openxmlformats.org/markup-compatibility/2006">
-        <mc:Choice xmlns:a14="http://schemas.microsoft.com/office/drawing/2010/main" Requires="a14">
+      <mc:AlternateContent xmlns:mc="http://schemas.openxmlformats.org/markup-compatibility/2006" xmlns:a14="http://schemas.microsoft.com/office/drawing/2010/main">
+        <mc:Choice Requires="a14">
           <p:sp>
             <p:nvSpPr>
               <p:cNvPr id="3" name="Content Placeholder 2">
@@ -36437,7 +36691,7 @@
             </p:txBody>
           </p:sp>
         </mc:Choice>
-        <mc:Fallback>
+        <mc:Fallback xmlns="">
           <p:sp>
             <p:nvSpPr>
               <p:cNvPr id="3" name="Content Placeholder 2">
@@ -36500,7 +36754,7 @@
           <a:p>
             <a:fld id="{629637A9-119A-49DA-BD12-AAC58B377D80}" type="slidenum">
               <a:rPr lang="en-US" smtClean="0"/>
-              <a:t>46</a:t>
+              <a:t>47</a:t>
             </a:fld>
             <a:endParaRPr lang="en-US" dirty="0"/>
           </a:p>
@@ -36549,7 +36803,7 @@
 </p:sld>
 </file>
 
-<file path=ppt/slides/slide47.xml><?xml version="1.0" encoding="utf-8"?>
+<file path=ppt/slides/slide48.xml><?xml version="1.0" encoding="utf-8"?>
 <p:sld xmlns:a="http://schemas.openxmlformats.org/drawingml/2006/main" xmlns:r="http://schemas.openxmlformats.org/officeDocument/2006/relationships" xmlns:p="http://schemas.openxmlformats.org/presentationml/2006/main">
   <p:cSld>
     <p:spTree>
@@ -36656,7 +36910,7 @@
           <a:p>
             <a:fld id="{629637A9-119A-49DA-BD12-AAC58B377D80}" type="slidenum">
               <a:rPr lang="en-US" smtClean="0"/>
-              <a:t>47</a:t>
+              <a:t>48</a:t>
             </a:fld>
             <a:endParaRPr lang="en-US" dirty="0"/>
           </a:p>
@@ -36750,8 +37004,8 @@
           </a:p>
         </p:txBody>
       </p:sp>
-      <mc:AlternateContent xmlns:mc="http://schemas.openxmlformats.org/markup-compatibility/2006">
-        <mc:Choice xmlns:a14="http://schemas.microsoft.com/office/drawing/2010/main" Requires="a14">
+      <mc:AlternateContent xmlns:mc="http://schemas.openxmlformats.org/markup-compatibility/2006" xmlns:a14="http://schemas.microsoft.com/office/drawing/2010/main">
+        <mc:Choice Requires="a14">
           <p:sp>
             <p:nvSpPr>
               <p:cNvPr id="3" name="Content Placeholder 2">
@@ -37114,7 +37368,7 @@
             </p:txBody>
           </p:sp>
         </mc:Choice>
-        <mc:Fallback>
+        <mc:Fallback xmlns="">
           <p:sp>
             <p:nvSpPr>
               <p:cNvPr id="3" name="Content Placeholder 2">
@@ -37300,8 +37554,8 @@
           </a:p>
         </p:txBody>
       </p:sp>
-      <mc:AlternateContent xmlns:mc="http://schemas.openxmlformats.org/markup-compatibility/2006">
-        <mc:Choice xmlns:a14="http://schemas.microsoft.com/office/drawing/2010/main" Requires="a14">
+      <mc:AlternateContent xmlns:mc="http://schemas.openxmlformats.org/markup-compatibility/2006" xmlns:a14="http://schemas.microsoft.com/office/drawing/2010/main">
+        <mc:Choice Requires="a14">
           <p:graphicFrame>
             <p:nvGraphicFramePr>
               <p:cNvPr id="5" name="Table 4">
@@ -37361,6 +37615,7 @@
                         <a:bodyPr/>
                         <a:lstStyle/>
                         <a:p>
+                          <a:pPr/>
                           <a14:m>
                             <m:oMathPara xmlns:m="http://schemas.openxmlformats.org/officeDocument/2006/math">
                               <m:oMathParaPr>
@@ -37386,6 +37641,7 @@
                         <a:bodyPr/>
                         <a:lstStyle/>
                         <a:p>
+                          <a:pPr/>
                           <a14:m>
                             <m:oMathPara xmlns:m="http://schemas.openxmlformats.org/officeDocument/2006/math">
                               <m:oMathParaPr>
@@ -37430,6 +37686,7 @@
                         <a:bodyPr/>
                         <a:lstStyle/>
                         <a:p>
+                          <a:pPr/>
                           <a14:m>
                             <m:oMathPara xmlns:m="http://schemas.openxmlformats.org/officeDocument/2006/math">
                               <m:oMathParaPr>
@@ -37710,7 +37967,7 @@
             </a:graphic>
           </p:graphicFrame>
         </mc:Choice>
-        <mc:Fallback>
+        <mc:Fallback xmlns="">
           <p:graphicFrame>
             <p:nvGraphicFramePr>
               <p:cNvPr id="5" name="Table 4">
@@ -38094,8 +38351,8 @@
           </a:p>
         </p:txBody>
       </p:sp>
-      <mc:AlternateContent xmlns:mc="http://schemas.openxmlformats.org/markup-compatibility/2006">
-        <mc:Choice xmlns:a14="http://schemas.microsoft.com/office/drawing/2010/main" Requires="a14">
+      <mc:AlternateContent xmlns:mc="http://schemas.openxmlformats.org/markup-compatibility/2006" xmlns:a14="http://schemas.microsoft.com/office/drawing/2010/main">
+        <mc:Choice Requires="a14">
           <p:sp>
             <p:nvSpPr>
               <p:cNvPr id="13" name="TextBox 12">
@@ -38130,6 +38387,7 @@
                 </a:r>
               </a:p>
               <a:p>
+                <a:pPr/>
                 <a:r>
                   <a:rPr lang="en-US" sz="2400" dirty="0"/>
                   <a:t>test point</a:t>
@@ -38182,7 +38440,7 @@
             </p:txBody>
           </p:sp>
         </mc:Choice>
-        <mc:Fallback>
+        <mc:Fallback xmlns="">
           <p:sp>
             <p:nvSpPr>
               <p:cNvPr id="13" name="TextBox 12">
@@ -38268,8 +38526,8 @@
           </a:fontRef>
         </p:style>
       </p:cxnSp>
-      <mc:AlternateContent xmlns:mc="http://schemas.openxmlformats.org/markup-compatibility/2006">
-        <mc:Choice xmlns:a14="http://schemas.microsoft.com/office/drawing/2010/main" Requires="a14">
+      <mc:AlternateContent xmlns:mc="http://schemas.openxmlformats.org/markup-compatibility/2006" xmlns:a14="http://schemas.microsoft.com/office/drawing/2010/main">
+        <mc:Choice Requires="a14">
           <p:sp>
             <p:nvSpPr>
               <p:cNvPr id="18" name="TextBox 17">
@@ -38298,6 +38556,7 @@
               </a:bodyPr>
               <a:lstStyle/>
               <a:p>
+                <a:pPr/>
                 <a:r>
                   <a:rPr lang="en-US" sz="2400" dirty="0"/>
                   <a:t>Prediction</a:t>
@@ -38362,7 +38621,7 @@
             </p:txBody>
           </p:sp>
         </mc:Choice>
-        <mc:Fallback>
+        <mc:Fallback xmlns="">
           <p:sp>
             <p:nvSpPr>
               <p:cNvPr id="18" name="TextBox 17">
@@ -38703,8 +38962,8 @@
           </a:p>
         </p:txBody>
       </p:sp>
-      <mc:AlternateContent xmlns:mc="http://schemas.openxmlformats.org/markup-compatibility/2006">
-        <mc:Choice xmlns:a14="http://schemas.microsoft.com/office/drawing/2010/main" Requires="a14">
+      <mc:AlternateContent xmlns:mc="http://schemas.openxmlformats.org/markup-compatibility/2006" xmlns:a14="http://schemas.microsoft.com/office/drawing/2010/main">
+        <mc:Choice Requires="a14">
           <p:sp>
             <p:nvSpPr>
               <p:cNvPr id="3" name="Content Placeholder 2">
@@ -38819,7 +39078,7 @@
             </p:txBody>
           </p:sp>
         </mc:Choice>
-        <mc:Fallback>
+        <mc:Fallback xmlns="">
           <p:sp>
             <p:nvSpPr>
               <p:cNvPr id="3" name="Content Placeholder 2">

</xml_diff>